<commit_message>
[Java] Improve a picture in the ATJ tutorial.
Make the text in the picture smaller.
</commit_message>
<xml_diff>
--- a/books/kestrel/java/atj/images/values.pptx
+++ b/books/kestrel/java/atj/images/values.pptx
@@ -210,7 +210,7 @@
           </a:lstStyle>
           <a:p>
             <a:fld id="{FBA984DD-C9F9-3049-8A3A-E9E0DCCCEBB1}" type="datetimeFigureOut">
-              <a:t>1/27/20</a:t>
+              <a:t>2/4/20</a:t>
             </a:fld>
             <a:endParaRPr lang="en-US"/>
           </a:p>
@@ -604,7 +604,7 @@
           <a:lstStyle/>
           <a:p>
             <a:fld id="{B6976737-B4AE-8046-B287-15D2357F1C0B}" type="datetimeFigureOut">
-              <a:t>1/27/20</a:t>
+              <a:t>2/4/20</a:t>
             </a:fld>
             <a:endParaRPr lang="en-US"/>
           </a:p>
@@ -770,7 +770,7 @@
           <a:lstStyle/>
           <a:p>
             <a:fld id="{B6976737-B4AE-8046-B287-15D2357F1C0B}" type="datetimeFigureOut">
-              <a:t>1/27/20</a:t>
+              <a:t>2/4/20</a:t>
             </a:fld>
             <a:endParaRPr lang="en-US"/>
           </a:p>
@@ -946,7 +946,7 @@
           <a:lstStyle/>
           <a:p>
             <a:fld id="{B6976737-B4AE-8046-B287-15D2357F1C0B}" type="datetimeFigureOut">
-              <a:t>1/27/20</a:t>
+              <a:t>2/4/20</a:t>
             </a:fld>
             <a:endParaRPr lang="en-US"/>
           </a:p>
@@ -1112,7 +1112,7 @@
           <a:lstStyle/>
           <a:p>
             <a:fld id="{B6976737-B4AE-8046-B287-15D2357F1C0B}" type="datetimeFigureOut">
-              <a:t>1/27/20</a:t>
+              <a:t>2/4/20</a:t>
             </a:fld>
             <a:endParaRPr lang="en-US"/>
           </a:p>
@@ -1353,7 +1353,7 @@
           <a:lstStyle/>
           <a:p>
             <a:fld id="{B6976737-B4AE-8046-B287-15D2357F1C0B}" type="datetimeFigureOut">
-              <a:t>1/27/20</a:t>
+              <a:t>2/4/20</a:t>
             </a:fld>
             <a:endParaRPr lang="en-US"/>
           </a:p>
@@ -1580,7 +1580,7 @@
           <a:lstStyle/>
           <a:p>
             <a:fld id="{B6976737-B4AE-8046-B287-15D2357F1C0B}" type="datetimeFigureOut">
-              <a:t>1/27/20</a:t>
+              <a:t>2/4/20</a:t>
             </a:fld>
             <a:endParaRPr lang="en-US"/>
           </a:p>
@@ -1942,7 +1942,7 @@
           <a:lstStyle/>
           <a:p>
             <a:fld id="{B6976737-B4AE-8046-B287-15D2357F1C0B}" type="datetimeFigureOut">
-              <a:t>1/27/20</a:t>
+              <a:t>2/4/20</a:t>
             </a:fld>
             <a:endParaRPr lang="en-US"/>
           </a:p>
@@ -2057,7 +2057,7 @@
           <a:lstStyle/>
           <a:p>
             <a:fld id="{B6976737-B4AE-8046-B287-15D2357F1C0B}" type="datetimeFigureOut">
-              <a:t>1/27/20</a:t>
+              <a:t>2/4/20</a:t>
             </a:fld>
             <a:endParaRPr lang="en-US"/>
           </a:p>
@@ -2150,7 +2150,7 @@
           <a:lstStyle/>
           <a:p>
             <a:fld id="{B6976737-B4AE-8046-B287-15D2357F1C0B}" type="datetimeFigureOut">
-              <a:t>1/27/20</a:t>
+              <a:t>2/4/20</a:t>
             </a:fld>
             <a:endParaRPr lang="en-US"/>
           </a:p>
@@ -2423,7 +2423,7 @@
           <a:lstStyle/>
           <a:p>
             <a:fld id="{B6976737-B4AE-8046-B287-15D2357F1C0B}" type="datetimeFigureOut">
-              <a:t>1/27/20</a:t>
+              <a:t>2/4/20</a:t>
             </a:fld>
             <a:endParaRPr lang="en-US"/>
           </a:p>
@@ -2676,7 +2676,7 @@
           <a:lstStyle/>
           <a:p>
             <a:fld id="{B6976737-B4AE-8046-B287-15D2357F1C0B}" type="datetimeFigureOut">
-              <a:t>1/27/20</a:t>
+              <a:t>2/4/20</a:t>
             </a:fld>
             <a:endParaRPr lang="en-US"/>
           </a:p>
@@ -2885,7 +2885,7 @@
           </a:lstStyle>
           <a:p>
             <a:fld id="{B6976737-B4AE-8046-B287-15D2357F1C0B}" type="datetimeFigureOut">
-              <a:t>1/27/20</a:t>
+              <a:t>2/4/20</a:t>
             </a:fld>
             <a:endParaRPr lang="en-US"/>
           </a:p>
@@ -3303,8 +3303,8 @@
         </p:nvSpPr>
         <p:spPr>
           <a:xfrm>
-            <a:off x="4762750" y="1770861"/>
-            <a:ext cx="842924" cy="400110"/>
+            <a:off x="4829691" y="1801639"/>
+            <a:ext cx="709041" cy="338554"/>
           </a:xfrm>
           <a:prstGeom prst="rect">
             <a:avLst/>
@@ -3338,7 +3338,7 @@
           <a:p>
             <a:pPr algn="ctr"/>
             <a:r>
-              <a:rPr lang="en-US" sz="2000">
+              <a:rPr lang="en-US" sz="1600">
                 <a:solidFill>
                   <a:schemeClr val="tx1"/>
                 </a:solidFill>
@@ -3397,7 +3397,7 @@
           <a:lstStyle/>
           <a:p>
             <a:pPr algn="ctr"/>
-            <a:endParaRPr lang="en-US" sz="2000"/>
+            <a:endParaRPr lang="en-US" sz="1600"/>
           </a:p>
         </p:txBody>
       </p:sp>
@@ -3455,7 +3455,7 @@
           <a:p>
             <a:pPr algn="ctr"/>
             <a:r>
-              <a:rPr lang="en-US" sz="2000">
+              <a:rPr lang="en-US" sz="1600">
                 <a:solidFill>
                   <a:schemeClr val="tx1"/>
                 </a:solidFill>
@@ -3520,7 +3520,7 @@
           <a:p>
             <a:pPr algn="ctr"/>
             <a:r>
-              <a:rPr lang="en-US" sz="2000">
+              <a:rPr lang="en-US" sz="1600">
                 <a:solidFill>
                   <a:schemeClr val="tx1"/>
                 </a:solidFill>
@@ -3585,7 +3585,7 @@
           <a:p>
             <a:pPr algn="ctr"/>
             <a:r>
-              <a:rPr lang="en-US" sz="2000">
+              <a:rPr lang="en-US" sz="1600">
                 <a:solidFill>
                   <a:schemeClr val="tx1"/>
                 </a:solidFill>
@@ -3650,7 +3650,7 @@
           <a:p>
             <a:pPr algn="ctr"/>
             <a:r>
-              <a:rPr lang="en-US" sz="2000">
+              <a:rPr lang="en-US" sz="1600">
                 <a:solidFill>
                   <a:schemeClr val="tx1"/>
                 </a:solidFill>
@@ -3715,7 +3715,7 @@
           <a:p>
             <a:pPr algn="ctr"/>
             <a:r>
-              <a:rPr lang="en-US" sz="2000">
+              <a:rPr lang="en-US" sz="1600">
                 <a:solidFill>
                   <a:schemeClr val="tx1"/>
                 </a:solidFill>
@@ -3780,7 +3780,7 @@
           <a:p>
             <a:pPr algn="ctr"/>
             <a:r>
-              <a:rPr lang="en-US" sz="2000">
+              <a:rPr lang="en-US" sz="1600">
                 <a:solidFill>
                   <a:schemeClr val="tx1"/>
                 </a:solidFill>
@@ -3845,7 +3845,7 @@
           <a:p>
             <a:pPr algn="ctr"/>
             <a:r>
-              <a:rPr lang="en-US" sz="2000">
+              <a:rPr lang="en-US" sz="1600">
                 <a:solidFill>
                   <a:schemeClr val="tx1"/>
                 </a:solidFill>
@@ -3870,10 +3870,10 @@
         </p:nvGrpSpPr>
         <p:grpSpPr>
           <a:xfrm>
-            <a:off x="349632" y="3212979"/>
-            <a:ext cx="1335835" cy="1272988"/>
-            <a:chOff x="349632" y="3212979"/>
-            <a:chExt cx="1335835" cy="1272988"/>
+            <a:off x="441869" y="3212979"/>
+            <a:ext cx="1243598" cy="1272988"/>
+            <a:chOff x="441869" y="3212979"/>
+            <a:chExt cx="1243598" cy="1272988"/>
           </a:xfrm>
         </p:grpSpPr>
         <p:sp>
@@ -3890,8 +3890,8 @@
           </p:nvSpPr>
           <p:spPr>
             <a:xfrm>
-              <a:off x="349632" y="3649418"/>
-              <a:ext cx="1089145" cy="400110"/>
+              <a:off x="441869" y="3680196"/>
+              <a:ext cx="904671" cy="338554"/>
             </a:xfrm>
             <a:prstGeom prst="rect">
               <a:avLst/>
@@ -3925,7 +3925,7 @@
             <a:p>
               <a:pPr algn="ctr"/>
               <a:r>
-                <a:rPr lang="en-US" sz="2000">
+                <a:rPr lang="en-US" sz="1600">
                   <a:solidFill>
                     <a:schemeClr val="tx1"/>
                   </a:solidFill>
@@ -3984,7 +3984,7 @@
             <a:lstStyle/>
             <a:p>
               <a:pPr algn="ctr"/>
-              <a:endParaRPr lang="en-US" sz="2000"/>
+              <a:endParaRPr lang="en-US" sz="1600"/>
             </a:p>
           </p:txBody>
         </p:sp>
@@ -4004,9 +4004,9 @@
         <p:grpSpPr>
           <a:xfrm>
             <a:off x="1780653" y="4566213"/>
-            <a:ext cx="1535859" cy="723083"/>
+            <a:ext cx="1535859" cy="692305"/>
             <a:chOff x="1780653" y="4566213"/>
-            <a:chExt cx="1535859" cy="723083"/>
+            <a:chExt cx="1535859" cy="692305"/>
           </a:xfrm>
         </p:grpSpPr>
         <p:sp>
@@ -4057,7 +4057,7 @@
             <a:lstStyle/>
             <a:p>
               <a:pPr algn="ctr"/>
-              <a:endParaRPr lang="en-US" sz="2000"/>
+              <a:endParaRPr lang="en-US" sz="1600"/>
             </a:p>
           </p:txBody>
         </p:sp>
@@ -4075,8 +4075,8 @@
           </p:nvSpPr>
           <p:spPr>
             <a:xfrm>
-              <a:off x="1994359" y="4889186"/>
-              <a:ext cx="1108445" cy="400110"/>
+              <a:off x="2087717" y="4919964"/>
+              <a:ext cx="921727" cy="338554"/>
             </a:xfrm>
             <a:prstGeom prst="rect">
               <a:avLst/>
@@ -4110,7 +4110,7 @@
             <a:p>
               <a:pPr algn="ctr"/>
               <a:r>
-                <a:rPr lang="en-US" sz="2000">
+                <a:rPr lang="en-US" sz="1600">
                   <a:solidFill>
                     <a:schemeClr val="tx1"/>
                   </a:solidFill>
@@ -4171,7 +4171,7 @@
           <a:lstStyle/>
           <a:p>
             <a:pPr algn="ctr"/>
-            <a:endParaRPr lang="en-US" sz="2000">
+            <a:endParaRPr lang="en-US" sz="1600">
               <a:solidFill>
                 <a:schemeClr val="tx1"/>
               </a:solidFill>

</xml_diff>